<commit_message>
Adding new diagram and fixes
</commit_message>
<xml_diff>
--- a/learn-pr/azure/design-your-migration-to-azure/media/planning banners.pptx
+++ b/learn-pr/azure/design-your-migration-to-azure/media/planning banners.pptx
@@ -7,6 +7,7 @@
   <p:sldIdLst>
     <p:sldId id="256" r:id="rId2"/>
     <p:sldId id="257" r:id="rId3"/>
+    <p:sldId id="258" r:id="rId4"/>
   </p:sldIdLst>
   <p:sldSz cx="12192000" cy="6858000"/>
   <p:notesSz cx="6858000" cy="9144000"/>
@@ -3152,7 +3153,7 @@
           <a:p>
             <a:fld id="{D236B06A-B169-44DA-A26B-BAAA28854A91}" type="datetimeFigureOut">
               <a:rPr lang="en-GB" smtClean="0"/>
-              <a:t>29/05/2019</a:t>
+              <a:t>17/06/2019</a:t>
             </a:fld>
             <a:endParaRPr lang="en-GB"/>
           </a:p>
@@ -3352,7 +3353,7 @@
           <a:p>
             <a:fld id="{D236B06A-B169-44DA-A26B-BAAA28854A91}" type="datetimeFigureOut">
               <a:rPr lang="en-GB" smtClean="0"/>
-              <a:t>29/05/2019</a:t>
+              <a:t>17/06/2019</a:t>
             </a:fld>
             <a:endParaRPr lang="en-GB"/>
           </a:p>
@@ -3562,7 +3563,7 @@
           <a:p>
             <a:fld id="{D236B06A-B169-44DA-A26B-BAAA28854A91}" type="datetimeFigureOut">
               <a:rPr lang="en-GB" smtClean="0"/>
-              <a:t>29/05/2019</a:t>
+              <a:t>17/06/2019</a:t>
             </a:fld>
             <a:endParaRPr lang="en-GB"/>
           </a:p>
@@ -3762,7 +3763,7 @@
           <a:p>
             <a:fld id="{D236B06A-B169-44DA-A26B-BAAA28854A91}" type="datetimeFigureOut">
               <a:rPr lang="en-GB" smtClean="0"/>
-              <a:t>29/05/2019</a:t>
+              <a:t>17/06/2019</a:t>
             </a:fld>
             <a:endParaRPr lang="en-GB"/>
           </a:p>
@@ -4038,7 +4039,7 @@
           <a:p>
             <a:fld id="{D236B06A-B169-44DA-A26B-BAAA28854A91}" type="datetimeFigureOut">
               <a:rPr lang="en-GB" smtClean="0"/>
-              <a:t>29/05/2019</a:t>
+              <a:t>17/06/2019</a:t>
             </a:fld>
             <a:endParaRPr lang="en-GB"/>
           </a:p>
@@ -4306,7 +4307,7 @@
           <a:p>
             <a:fld id="{D236B06A-B169-44DA-A26B-BAAA28854A91}" type="datetimeFigureOut">
               <a:rPr lang="en-GB" smtClean="0"/>
-              <a:t>29/05/2019</a:t>
+              <a:t>17/06/2019</a:t>
             </a:fld>
             <a:endParaRPr lang="en-GB"/>
           </a:p>
@@ -4721,7 +4722,7 @@
           <a:p>
             <a:fld id="{D236B06A-B169-44DA-A26B-BAAA28854A91}" type="datetimeFigureOut">
               <a:rPr lang="en-GB" smtClean="0"/>
-              <a:t>29/05/2019</a:t>
+              <a:t>17/06/2019</a:t>
             </a:fld>
             <a:endParaRPr lang="en-GB"/>
           </a:p>
@@ -4863,7 +4864,7 @@
           <a:p>
             <a:fld id="{D236B06A-B169-44DA-A26B-BAAA28854A91}" type="datetimeFigureOut">
               <a:rPr lang="en-GB" smtClean="0"/>
-              <a:t>29/05/2019</a:t>
+              <a:t>17/06/2019</a:t>
             </a:fld>
             <a:endParaRPr lang="en-GB"/>
           </a:p>
@@ -4976,7 +4977,7 @@
           <a:p>
             <a:fld id="{D236B06A-B169-44DA-A26B-BAAA28854A91}" type="datetimeFigureOut">
               <a:rPr lang="en-GB" smtClean="0"/>
-              <a:t>29/05/2019</a:t>
+              <a:t>17/06/2019</a:t>
             </a:fld>
             <a:endParaRPr lang="en-GB"/>
           </a:p>
@@ -5289,7 +5290,7 @@
           <a:p>
             <a:fld id="{D236B06A-B169-44DA-A26B-BAAA28854A91}" type="datetimeFigureOut">
               <a:rPr lang="en-GB" smtClean="0"/>
-              <a:t>29/05/2019</a:t>
+              <a:t>17/06/2019</a:t>
             </a:fld>
             <a:endParaRPr lang="en-GB"/>
           </a:p>
@@ -5578,7 +5579,7 @@
           <a:p>
             <a:fld id="{D236B06A-B169-44DA-A26B-BAAA28854A91}" type="datetimeFigureOut">
               <a:rPr lang="en-GB" smtClean="0"/>
-              <a:t>29/05/2019</a:t>
+              <a:t>17/06/2019</a:t>
             </a:fld>
             <a:endParaRPr lang="en-GB"/>
           </a:p>
@@ -5821,7 +5822,7 @@
           <a:p>
             <a:fld id="{D236B06A-B169-44DA-A26B-BAAA28854A91}" type="datetimeFigureOut">
               <a:rPr lang="en-GB" smtClean="0"/>
-              <a:t>29/05/2019</a:t>
+              <a:t>17/06/2019</a:t>
             </a:fld>
             <a:endParaRPr lang="en-GB"/>
           </a:p>
@@ -7610,6 +7611,1451 @@
 </p:sld>
 </file>
 
+<file path=ppt/slides/slide3.xml><?xml version="1.0" encoding="utf-8"?>
+<p:sld xmlns:a="http://schemas.openxmlformats.org/drawingml/2006/main" xmlns:r="http://schemas.openxmlformats.org/officeDocument/2006/relationships" xmlns:p="http://schemas.openxmlformats.org/presentationml/2006/main">
+  <p:cSld>
+    <p:spTree>
+      <p:nvGrpSpPr>
+        <p:cNvPr id="1" name=""/>
+        <p:cNvGrpSpPr/>
+        <p:nvPr/>
+      </p:nvGrpSpPr>
+      <p:grpSpPr>
+        <a:xfrm>
+          <a:off x="0" y="0"/>
+          <a:ext cx="0" cy="0"/>
+          <a:chOff x="0" y="0"/>
+          <a:chExt cx="0" cy="0"/>
+        </a:xfrm>
+      </p:grpSpPr>
+      <p:grpSp>
+        <p:nvGrpSpPr>
+          <p:cNvPr id="42" name="Group 41">
+            <a:extLst>
+              <a:ext uri="{FF2B5EF4-FFF2-40B4-BE49-F238E27FC236}">
+                <a16:creationId xmlns:a16="http://schemas.microsoft.com/office/drawing/2014/main" id="{4BA2615B-0EB7-4E05-92EA-62B450666658}"/>
+              </a:ext>
+            </a:extLst>
+          </p:cNvPr>
+          <p:cNvGrpSpPr/>
+          <p:nvPr/>
+        </p:nvGrpSpPr>
+        <p:grpSpPr>
+          <a:xfrm>
+            <a:off x="838986" y="593889"/>
+            <a:ext cx="10322350" cy="4982065"/>
+            <a:chOff x="838986" y="593889"/>
+            <a:chExt cx="10322350" cy="4982065"/>
+          </a:xfrm>
+        </p:grpSpPr>
+        <p:sp>
+          <p:nvSpPr>
+            <p:cNvPr id="41" name="Rectangle 40">
+              <a:extLst>
+                <a:ext uri="{FF2B5EF4-FFF2-40B4-BE49-F238E27FC236}">
+                  <a16:creationId xmlns:a16="http://schemas.microsoft.com/office/drawing/2014/main" id="{0237C6AD-11D9-4CDE-9370-871DCA5AFAB4}"/>
+                </a:ext>
+              </a:extLst>
+            </p:cNvPr>
+            <p:cNvSpPr/>
+            <p:nvPr/>
+          </p:nvSpPr>
+          <p:spPr>
+            <a:xfrm>
+              <a:off x="838986" y="593889"/>
+              <a:ext cx="10322350" cy="4982065"/>
+            </a:xfrm>
+            <a:prstGeom prst="rect">
+              <a:avLst/>
+            </a:prstGeom>
+            <a:solidFill>
+              <a:schemeClr val="bg1"/>
+            </a:solidFill>
+            <a:ln w="3175">
+              <a:solidFill>
+                <a:srgbClr val="C3C3C3"/>
+              </a:solidFill>
+            </a:ln>
+          </p:spPr>
+          <p:style>
+            <a:lnRef idx="2">
+              <a:schemeClr val="accent1">
+                <a:shade val="50000"/>
+              </a:schemeClr>
+            </a:lnRef>
+            <a:fillRef idx="1">
+              <a:schemeClr val="accent1"/>
+            </a:fillRef>
+            <a:effectRef idx="0">
+              <a:schemeClr val="accent1"/>
+            </a:effectRef>
+            <a:fontRef idx="minor">
+              <a:schemeClr val="lt1"/>
+            </a:fontRef>
+          </p:style>
+          <p:txBody>
+            <a:bodyPr rtlCol="0" anchor="ctr"/>
+            <a:lstStyle/>
+            <a:p>
+              <a:pPr algn="ctr"/>
+              <a:endParaRPr lang="en-GB"/>
+            </a:p>
+          </p:txBody>
+        </p:sp>
+        <p:pic>
+          <p:nvPicPr>
+            <p:cNvPr id="4" name="Picture 3">
+              <a:extLst>
+                <a:ext uri="{FF2B5EF4-FFF2-40B4-BE49-F238E27FC236}">
+                  <a16:creationId xmlns:a16="http://schemas.microsoft.com/office/drawing/2014/main" id="{49F4B8E5-F902-4529-A9D6-FDC096C48CD6}"/>
+                </a:ext>
+              </a:extLst>
+            </p:cNvPr>
+            <p:cNvPicPr>
+              <a:picLocks noChangeAspect="1"/>
+            </p:cNvPicPr>
+            <p:nvPr/>
+          </p:nvPicPr>
+          <p:blipFill rotWithShape="1">
+            <a:blip r:embed="rId2">
+              <a:clrChange>
+                <a:clrFrom>
+                  <a:srgbClr val="FFFFFF"/>
+                </a:clrFrom>
+                <a:clrTo>
+                  <a:srgbClr val="FFFFFF">
+                    <a:alpha val="0"/>
+                  </a:srgbClr>
+                </a:clrTo>
+              </a:clrChange>
+            </a:blip>
+            <a:srcRect l="8640" t="7807" r="8713" b="8462"/>
+            <a:stretch/>
+          </p:blipFill>
+          <p:spPr>
+            <a:xfrm>
+              <a:off x="5276882" y="2295427"/>
+              <a:ext cx="1529271" cy="1300900"/>
+            </a:xfrm>
+            <a:prstGeom prst="rect">
+              <a:avLst/>
+            </a:prstGeom>
+          </p:spPr>
+        </p:pic>
+        <p:sp>
+          <p:nvSpPr>
+            <p:cNvPr id="5" name="Rectangle: Rounded Corners 4">
+              <a:extLst>
+                <a:ext uri="{FF2B5EF4-FFF2-40B4-BE49-F238E27FC236}">
+                  <a16:creationId xmlns:a16="http://schemas.microsoft.com/office/drawing/2014/main" id="{F6603FFB-EE9F-46FB-9881-9A9B9DEC5F2D}"/>
+                </a:ext>
+              </a:extLst>
+            </p:cNvPr>
+            <p:cNvSpPr/>
+            <p:nvPr/>
+          </p:nvSpPr>
+          <p:spPr>
+            <a:xfrm>
+              <a:off x="7878224" y="1282046"/>
+              <a:ext cx="2931736" cy="3327662"/>
+            </a:xfrm>
+            <a:prstGeom prst="roundRect">
+              <a:avLst>
+                <a:gd name="adj" fmla="val 2841"/>
+              </a:avLst>
+            </a:prstGeom>
+            <a:solidFill>
+              <a:srgbClr val="59B4D9"/>
+            </a:solidFill>
+            <a:ln>
+              <a:noFill/>
+            </a:ln>
+          </p:spPr>
+          <p:style>
+            <a:lnRef idx="2">
+              <a:schemeClr val="accent1">
+                <a:shade val="50000"/>
+              </a:schemeClr>
+            </a:lnRef>
+            <a:fillRef idx="1">
+              <a:schemeClr val="accent1"/>
+            </a:fillRef>
+            <a:effectRef idx="0">
+              <a:schemeClr val="accent1"/>
+            </a:effectRef>
+            <a:fontRef idx="minor">
+              <a:schemeClr val="lt1"/>
+            </a:fontRef>
+          </p:style>
+          <p:txBody>
+            <a:bodyPr rtlCol="0" anchor="t" anchorCtr="0"/>
+            <a:lstStyle/>
+            <a:p>
+              <a:pPr algn="ctr"/>
+              <a:r>
+                <a:rPr lang="en-GB" dirty="0">
+                  <a:latin typeface="Segoe UI Semibold" panose="020B0702040204020203" pitchFamily="34" charset="0"/>
+                  <a:cs typeface="Segoe UI Semibold" panose="020B0702040204020203" pitchFamily="34" charset="0"/>
+                </a:rPr>
+                <a:t>vCenter</a:t>
+              </a:r>
+            </a:p>
+          </p:txBody>
+        </p:sp>
+        <p:sp>
+          <p:nvSpPr>
+            <p:cNvPr id="6" name="Arrow: Left 5">
+              <a:extLst>
+                <a:ext uri="{FF2B5EF4-FFF2-40B4-BE49-F238E27FC236}">
+                  <a16:creationId xmlns:a16="http://schemas.microsoft.com/office/drawing/2014/main" id="{9B899BDF-E2FB-4C2A-807E-54CDC14864AF}"/>
+                </a:ext>
+              </a:extLst>
+            </p:cNvPr>
+            <p:cNvSpPr/>
+            <p:nvPr/>
+          </p:nvSpPr>
+          <p:spPr>
+            <a:xfrm>
+              <a:off x="6806153" y="2295427"/>
+              <a:ext cx="1630837" cy="1150070"/>
+            </a:xfrm>
+            <a:prstGeom prst="leftArrow">
+              <a:avLst/>
+            </a:prstGeom>
+            <a:solidFill>
+              <a:srgbClr val="59B4D9"/>
+            </a:solidFill>
+            <a:ln>
+              <a:noFill/>
+            </a:ln>
+          </p:spPr>
+          <p:style>
+            <a:lnRef idx="2">
+              <a:schemeClr val="accent1">
+                <a:shade val="50000"/>
+              </a:schemeClr>
+            </a:lnRef>
+            <a:fillRef idx="1">
+              <a:schemeClr val="accent1"/>
+            </a:fillRef>
+            <a:effectRef idx="0">
+              <a:schemeClr val="accent1"/>
+            </a:effectRef>
+            <a:fontRef idx="minor">
+              <a:schemeClr val="lt1"/>
+            </a:fontRef>
+          </p:style>
+          <p:txBody>
+            <a:bodyPr rtlCol="0" anchor="ctr"/>
+            <a:lstStyle/>
+            <a:p>
+              <a:pPr algn="ctr"/>
+              <a:endParaRPr lang="en-GB">
+                <a:latin typeface="Segoe UI Semibold" panose="020B0702040204020203" pitchFamily="34" charset="0"/>
+                <a:cs typeface="Segoe UI Semibold" panose="020B0702040204020203" pitchFamily="34" charset="0"/>
+              </a:endParaRPr>
+            </a:p>
+          </p:txBody>
+        </p:sp>
+        <p:sp>
+          <p:nvSpPr>
+            <p:cNvPr id="7" name="Rectangle: Rounded Corners 6">
+              <a:extLst>
+                <a:ext uri="{FF2B5EF4-FFF2-40B4-BE49-F238E27FC236}">
+                  <a16:creationId xmlns:a16="http://schemas.microsoft.com/office/drawing/2014/main" id="{49F71B12-1791-42B6-B04C-C74A739DEB5B}"/>
+                </a:ext>
+              </a:extLst>
+            </p:cNvPr>
+            <p:cNvSpPr/>
+            <p:nvPr/>
+          </p:nvSpPr>
+          <p:spPr>
+            <a:xfrm>
+              <a:off x="1183520" y="1282046"/>
+              <a:ext cx="2931736" cy="3327662"/>
+            </a:xfrm>
+            <a:prstGeom prst="roundRect">
+              <a:avLst>
+                <a:gd name="adj" fmla="val 2841"/>
+              </a:avLst>
+            </a:prstGeom>
+            <a:solidFill>
+              <a:srgbClr val="0072C6"/>
+            </a:solidFill>
+            <a:ln>
+              <a:noFill/>
+            </a:ln>
+          </p:spPr>
+          <p:style>
+            <a:lnRef idx="2">
+              <a:schemeClr val="accent1">
+                <a:shade val="50000"/>
+              </a:schemeClr>
+            </a:lnRef>
+            <a:fillRef idx="1">
+              <a:schemeClr val="accent1"/>
+            </a:fillRef>
+            <a:effectRef idx="0">
+              <a:schemeClr val="accent1"/>
+            </a:effectRef>
+            <a:fontRef idx="minor">
+              <a:schemeClr val="lt1"/>
+            </a:fontRef>
+          </p:style>
+          <p:txBody>
+            <a:bodyPr rtlCol="0" anchor="t" anchorCtr="0"/>
+            <a:lstStyle/>
+            <a:p>
+              <a:pPr algn="ctr"/>
+              <a:r>
+                <a:rPr lang="en-GB" dirty="0">
+                  <a:latin typeface="Segoe UI Semibold" panose="020B0702040204020203" pitchFamily="34" charset="0"/>
+                  <a:cs typeface="Segoe UI Semibold" panose="020B0702040204020203" pitchFamily="34" charset="0"/>
+                </a:rPr>
+                <a:t>Recovery Services vault</a:t>
+              </a:r>
+            </a:p>
+          </p:txBody>
+        </p:sp>
+        <p:sp>
+          <p:nvSpPr>
+            <p:cNvPr id="8" name="Arrow: Left 7">
+              <a:extLst>
+                <a:ext uri="{FF2B5EF4-FFF2-40B4-BE49-F238E27FC236}">
+                  <a16:creationId xmlns:a16="http://schemas.microsoft.com/office/drawing/2014/main" id="{C25AC5CD-5219-4EBA-B9D4-4F4B9E806E00}"/>
+                </a:ext>
+              </a:extLst>
+            </p:cNvPr>
+            <p:cNvSpPr/>
+            <p:nvPr/>
+          </p:nvSpPr>
+          <p:spPr>
+            <a:xfrm>
+              <a:off x="4115256" y="2295427"/>
+              <a:ext cx="1161626" cy="1150070"/>
+            </a:xfrm>
+            <a:prstGeom prst="leftArrow">
+              <a:avLst/>
+            </a:prstGeom>
+            <a:solidFill>
+              <a:srgbClr val="0072C6"/>
+            </a:solidFill>
+            <a:ln>
+              <a:noFill/>
+            </a:ln>
+          </p:spPr>
+          <p:style>
+            <a:lnRef idx="2">
+              <a:schemeClr val="accent1">
+                <a:shade val="50000"/>
+              </a:schemeClr>
+            </a:lnRef>
+            <a:fillRef idx="1">
+              <a:schemeClr val="accent1"/>
+            </a:fillRef>
+            <a:effectRef idx="0">
+              <a:schemeClr val="accent1"/>
+            </a:effectRef>
+            <a:fontRef idx="minor">
+              <a:schemeClr val="lt1"/>
+            </a:fontRef>
+          </p:style>
+          <p:txBody>
+            <a:bodyPr rtlCol="0" anchor="ctr"/>
+            <a:lstStyle/>
+            <a:p>
+              <a:pPr algn="ctr"/>
+              <a:endParaRPr lang="en-GB">
+                <a:latin typeface="Segoe UI Semibold" panose="020B0702040204020203" pitchFamily="34" charset="0"/>
+                <a:cs typeface="Segoe UI Semibold" panose="020B0702040204020203" pitchFamily="34" charset="0"/>
+              </a:endParaRPr>
+            </a:p>
+          </p:txBody>
+        </p:sp>
+        <p:pic>
+          <p:nvPicPr>
+            <p:cNvPr id="11" name="Graphic 10" descr="Monitor">
+              <a:extLst>
+                <a:ext uri="{FF2B5EF4-FFF2-40B4-BE49-F238E27FC236}">
+                  <a16:creationId xmlns:a16="http://schemas.microsoft.com/office/drawing/2014/main" id="{208BFD5E-6755-4165-9E47-D31E8CD9871B}"/>
+                </a:ext>
+              </a:extLst>
+            </p:cNvPr>
+            <p:cNvPicPr>
+              <a:picLocks noChangeAspect="1"/>
+            </p:cNvPicPr>
+            <p:nvPr/>
+          </p:nvPicPr>
+          <p:blipFill>
+            <a:blip r:embed="rId3">
+              <a:extLst>
+                <a:ext uri="{28A0092B-C50C-407E-A947-70E740481C1C}">
+                  <a14:useLocalDpi xmlns:a14="http://schemas.microsoft.com/office/drawing/2010/main" val="0"/>
+                </a:ext>
+                <a:ext uri="{96DAC541-7B7A-43D3-8B79-37D633B846F1}">
+                  <asvg:svgBlip xmlns:asvg="http://schemas.microsoft.com/office/drawing/2016/SVG/main" r:embed="rId4"/>
+                </a:ext>
+              </a:extLst>
+            </a:blip>
+            <a:stretch>
+              <a:fillRect/>
+            </a:stretch>
+          </p:blipFill>
+          <p:spPr>
+            <a:xfrm>
+              <a:off x="8150311" y="1617460"/>
+              <a:ext cx="1072070" cy="1072070"/>
+            </a:xfrm>
+            <a:prstGeom prst="rect">
+              <a:avLst/>
+            </a:prstGeom>
+          </p:spPr>
+        </p:pic>
+        <p:pic>
+          <p:nvPicPr>
+            <p:cNvPr id="13" name="Graphic 12" descr="Cloud Computing">
+              <a:extLst>
+                <a:ext uri="{FF2B5EF4-FFF2-40B4-BE49-F238E27FC236}">
+                  <a16:creationId xmlns:a16="http://schemas.microsoft.com/office/drawing/2014/main" id="{A2FDD0FB-A9C6-42B9-9AB0-2DE043630A92}"/>
+                </a:ext>
+              </a:extLst>
+            </p:cNvPr>
+            <p:cNvPicPr>
+              <a:picLocks noChangeAspect="1"/>
+            </p:cNvPicPr>
+            <p:nvPr/>
+          </p:nvPicPr>
+          <p:blipFill>
+            <a:blip r:embed="rId5">
+              <a:extLst>
+                <a:ext uri="{28A0092B-C50C-407E-A947-70E740481C1C}">
+                  <a14:useLocalDpi xmlns:a14="http://schemas.microsoft.com/office/drawing/2010/main" val="0"/>
+                </a:ext>
+                <a:ext uri="{96DAC541-7B7A-43D3-8B79-37D633B846F1}">
+                  <asvg:svgBlip xmlns:asvg="http://schemas.microsoft.com/office/drawing/2016/SVG/main" r:embed="rId6"/>
+                </a:ext>
+              </a:extLst>
+            </a:blip>
+            <a:stretch>
+              <a:fillRect/>
+            </a:stretch>
+          </p:blipFill>
+          <p:spPr>
+            <a:xfrm>
+              <a:off x="7979790" y="3620615"/>
+              <a:ext cx="914400" cy="914400"/>
+            </a:xfrm>
+            <a:prstGeom prst="rect">
+              <a:avLst/>
+            </a:prstGeom>
+          </p:spPr>
+        </p:pic>
+        <p:pic>
+          <p:nvPicPr>
+            <p:cNvPr id="14" name="Graphic 13" descr="Monitor">
+              <a:extLst>
+                <a:ext uri="{FF2B5EF4-FFF2-40B4-BE49-F238E27FC236}">
+                  <a16:creationId xmlns:a16="http://schemas.microsoft.com/office/drawing/2014/main" id="{69AC1E57-E952-4060-8661-406888E26C73}"/>
+                </a:ext>
+              </a:extLst>
+            </p:cNvPr>
+            <p:cNvPicPr>
+              <a:picLocks noChangeAspect="1"/>
+            </p:cNvPicPr>
+            <p:nvPr/>
+          </p:nvPicPr>
+          <p:blipFill>
+            <a:blip r:embed="rId3">
+              <a:extLst>
+                <a:ext uri="{28A0092B-C50C-407E-A947-70E740481C1C}">
+                  <a14:useLocalDpi xmlns:a14="http://schemas.microsoft.com/office/drawing/2010/main" val="0"/>
+                </a:ext>
+                <a:ext uri="{96DAC541-7B7A-43D3-8B79-37D633B846F1}">
+                  <asvg:svgBlip xmlns:asvg="http://schemas.microsoft.com/office/drawing/2016/SVG/main" r:embed="rId4"/>
+                </a:ext>
+              </a:extLst>
+            </a:blip>
+            <a:stretch>
+              <a:fillRect/>
+            </a:stretch>
+          </p:blipFill>
+          <p:spPr>
+            <a:xfrm>
+              <a:off x="9480135" y="1617460"/>
+              <a:ext cx="1072070" cy="1072070"/>
+            </a:xfrm>
+            <a:prstGeom prst="rect">
+              <a:avLst/>
+            </a:prstGeom>
+          </p:spPr>
+        </p:pic>
+        <p:pic>
+          <p:nvPicPr>
+            <p:cNvPr id="15" name="Graphic 14" descr="Monitor">
+              <a:extLst>
+                <a:ext uri="{FF2B5EF4-FFF2-40B4-BE49-F238E27FC236}">
+                  <a16:creationId xmlns:a16="http://schemas.microsoft.com/office/drawing/2014/main" id="{11620D19-14CD-43CE-A18E-DC5B02DD9E12}"/>
+                </a:ext>
+              </a:extLst>
+            </p:cNvPr>
+            <p:cNvPicPr>
+              <a:picLocks noChangeAspect="1"/>
+            </p:cNvPicPr>
+            <p:nvPr/>
+          </p:nvPicPr>
+          <p:blipFill>
+            <a:blip r:embed="rId3">
+              <a:extLst>
+                <a:ext uri="{28A0092B-C50C-407E-A947-70E740481C1C}">
+                  <a14:useLocalDpi xmlns:a14="http://schemas.microsoft.com/office/drawing/2010/main" val="0"/>
+                </a:ext>
+                <a:ext uri="{96DAC541-7B7A-43D3-8B79-37D633B846F1}">
+                  <asvg:svgBlip xmlns:asvg="http://schemas.microsoft.com/office/drawing/2016/SVG/main" r:embed="rId4"/>
+                </a:ext>
+              </a:extLst>
+            </a:blip>
+            <a:stretch>
+              <a:fillRect/>
+            </a:stretch>
+          </p:blipFill>
+          <p:spPr>
+            <a:xfrm>
+              <a:off x="8150311" y="2483279"/>
+              <a:ext cx="1072070" cy="1072070"/>
+            </a:xfrm>
+            <a:prstGeom prst="rect">
+              <a:avLst/>
+            </a:prstGeom>
+          </p:spPr>
+        </p:pic>
+        <p:pic>
+          <p:nvPicPr>
+            <p:cNvPr id="16" name="Graphic 15" descr="Monitor">
+              <a:extLst>
+                <a:ext uri="{FF2B5EF4-FFF2-40B4-BE49-F238E27FC236}">
+                  <a16:creationId xmlns:a16="http://schemas.microsoft.com/office/drawing/2014/main" id="{1766ABA9-E5BE-48C4-A063-5D6A7196DE65}"/>
+                </a:ext>
+              </a:extLst>
+            </p:cNvPr>
+            <p:cNvPicPr>
+              <a:picLocks noChangeAspect="1"/>
+            </p:cNvPicPr>
+            <p:nvPr/>
+          </p:nvPicPr>
+          <p:blipFill>
+            <a:blip r:embed="rId3">
+              <a:extLst>
+                <a:ext uri="{28A0092B-C50C-407E-A947-70E740481C1C}">
+                  <a14:useLocalDpi xmlns:a14="http://schemas.microsoft.com/office/drawing/2010/main" val="0"/>
+                </a:ext>
+                <a:ext uri="{96DAC541-7B7A-43D3-8B79-37D633B846F1}">
+                  <asvg:svgBlip xmlns:asvg="http://schemas.microsoft.com/office/drawing/2016/SVG/main" r:embed="rId4"/>
+                </a:ext>
+              </a:extLst>
+            </a:blip>
+            <a:stretch>
+              <a:fillRect/>
+            </a:stretch>
+          </p:blipFill>
+          <p:spPr>
+            <a:xfrm>
+              <a:off x="9480135" y="2483279"/>
+              <a:ext cx="1072070" cy="1072070"/>
+            </a:xfrm>
+            <a:prstGeom prst="rect">
+              <a:avLst/>
+            </a:prstGeom>
+          </p:spPr>
+        </p:pic>
+        <p:pic>
+          <p:nvPicPr>
+            <p:cNvPr id="17" name="Graphic 16" descr="Monitor">
+              <a:extLst>
+                <a:ext uri="{FF2B5EF4-FFF2-40B4-BE49-F238E27FC236}">
+                  <a16:creationId xmlns:a16="http://schemas.microsoft.com/office/drawing/2014/main" id="{B282D3C6-E1F6-4047-AA37-6434162DE4C5}"/>
+                </a:ext>
+              </a:extLst>
+            </p:cNvPr>
+            <p:cNvPicPr>
+              <a:picLocks noChangeAspect="1"/>
+            </p:cNvPicPr>
+            <p:nvPr/>
+          </p:nvPicPr>
+          <p:blipFill>
+            <a:blip r:embed="rId3">
+              <a:extLst>
+                <a:ext uri="{28A0092B-C50C-407E-A947-70E740481C1C}">
+                  <a14:useLocalDpi xmlns:a14="http://schemas.microsoft.com/office/drawing/2010/main" val="0"/>
+                </a:ext>
+                <a:ext uri="{96DAC541-7B7A-43D3-8B79-37D633B846F1}">
+                  <asvg:svgBlip xmlns:asvg="http://schemas.microsoft.com/office/drawing/2016/SVG/main" r:embed="rId4"/>
+                </a:ext>
+              </a:extLst>
+            </a:blip>
+            <a:stretch>
+              <a:fillRect/>
+            </a:stretch>
+          </p:blipFill>
+          <p:spPr>
+            <a:xfrm>
+              <a:off x="1455607" y="1617460"/>
+              <a:ext cx="1072070" cy="1072070"/>
+            </a:xfrm>
+            <a:prstGeom prst="rect">
+              <a:avLst/>
+            </a:prstGeom>
+          </p:spPr>
+        </p:pic>
+        <p:pic>
+          <p:nvPicPr>
+            <p:cNvPr id="18" name="Graphic 17" descr="Monitor">
+              <a:extLst>
+                <a:ext uri="{FF2B5EF4-FFF2-40B4-BE49-F238E27FC236}">
+                  <a16:creationId xmlns:a16="http://schemas.microsoft.com/office/drawing/2014/main" id="{1FA7B988-AC97-4695-8B35-FE5B6347AA1C}"/>
+                </a:ext>
+              </a:extLst>
+            </p:cNvPr>
+            <p:cNvPicPr>
+              <a:picLocks noChangeAspect="1"/>
+            </p:cNvPicPr>
+            <p:nvPr/>
+          </p:nvPicPr>
+          <p:blipFill>
+            <a:blip r:embed="rId3">
+              <a:extLst>
+                <a:ext uri="{28A0092B-C50C-407E-A947-70E740481C1C}">
+                  <a14:useLocalDpi xmlns:a14="http://schemas.microsoft.com/office/drawing/2010/main" val="0"/>
+                </a:ext>
+                <a:ext uri="{96DAC541-7B7A-43D3-8B79-37D633B846F1}">
+                  <asvg:svgBlip xmlns:asvg="http://schemas.microsoft.com/office/drawing/2016/SVG/main" r:embed="rId4"/>
+                </a:ext>
+              </a:extLst>
+            </a:blip>
+            <a:stretch>
+              <a:fillRect/>
+            </a:stretch>
+          </p:blipFill>
+          <p:spPr>
+            <a:xfrm>
+              <a:off x="2785431" y="1617460"/>
+              <a:ext cx="1072070" cy="1072070"/>
+            </a:xfrm>
+            <a:prstGeom prst="rect">
+              <a:avLst/>
+            </a:prstGeom>
+          </p:spPr>
+        </p:pic>
+        <p:pic>
+          <p:nvPicPr>
+            <p:cNvPr id="19" name="Graphic 18" descr="Monitor">
+              <a:extLst>
+                <a:ext uri="{FF2B5EF4-FFF2-40B4-BE49-F238E27FC236}">
+                  <a16:creationId xmlns:a16="http://schemas.microsoft.com/office/drawing/2014/main" id="{8236D40F-6B53-450C-8DFC-4E216B0B2745}"/>
+                </a:ext>
+              </a:extLst>
+            </p:cNvPr>
+            <p:cNvPicPr>
+              <a:picLocks noChangeAspect="1"/>
+            </p:cNvPicPr>
+            <p:nvPr/>
+          </p:nvPicPr>
+          <p:blipFill>
+            <a:blip r:embed="rId3">
+              <a:extLst>
+                <a:ext uri="{28A0092B-C50C-407E-A947-70E740481C1C}">
+                  <a14:useLocalDpi xmlns:a14="http://schemas.microsoft.com/office/drawing/2010/main" val="0"/>
+                </a:ext>
+                <a:ext uri="{96DAC541-7B7A-43D3-8B79-37D633B846F1}">
+                  <asvg:svgBlip xmlns:asvg="http://schemas.microsoft.com/office/drawing/2016/SVG/main" r:embed="rId4"/>
+                </a:ext>
+              </a:extLst>
+            </a:blip>
+            <a:stretch>
+              <a:fillRect/>
+            </a:stretch>
+          </p:blipFill>
+          <p:spPr>
+            <a:xfrm>
+              <a:off x="1455607" y="2483279"/>
+              <a:ext cx="1072070" cy="1072070"/>
+            </a:xfrm>
+            <a:prstGeom prst="rect">
+              <a:avLst/>
+            </a:prstGeom>
+          </p:spPr>
+        </p:pic>
+        <p:pic>
+          <p:nvPicPr>
+            <p:cNvPr id="20" name="Graphic 19" descr="Monitor">
+              <a:extLst>
+                <a:ext uri="{FF2B5EF4-FFF2-40B4-BE49-F238E27FC236}">
+                  <a16:creationId xmlns:a16="http://schemas.microsoft.com/office/drawing/2014/main" id="{6F7EF1D3-17C2-413F-8644-A57D288A1C09}"/>
+                </a:ext>
+              </a:extLst>
+            </p:cNvPr>
+            <p:cNvPicPr>
+              <a:picLocks noChangeAspect="1"/>
+            </p:cNvPicPr>
+            <p:nvPr/>
+          </p:nvPicPr>
+          <p:blipFill>
+            <a:blip r:embed="rId3">
+              <a:extLst>
+                <a:ext uri="{28A0092B-C50C-407E-A947-70E740481C1C}">
+                  <a14:useLocalDpi xmlns:a14="http://schemas.microsoft.com/office/drawing/2010/main" val="0"/>
+                </a:ext>
+                <a:ext uri="{96DAC541-7B7A-43D3-8B79-37D633B846F1}">
+                  <asvg:svgBlip xmlns:asvg="http://schemas.microsoft.com/office/drawing/2016/SVG/main" r:embed="rId4"/>
+                </a:ext>
+              </a:extLst>
+            </a:blip>
+            <a:stretch>
+              <a:fillRect/>
+            </a:stretch>
+          </p:blipFill>
+          <p:spPr>
+            <a:xfrm>
+              <a:off x="2785431" y="2483279"/>
+              <a:ext cx="1072070" cy="1072070"/>
+            </a:xfrm>
+            <a:prstGeom prst="rect">
+              <a:avLst/>
+            </a:prstGeom>
+          </p:spPr>
+        </p:pic>
+        <p:sp>
+          <p:nvSpPr>
+            <p:cNvPr id="22" name="TextBox 21">
+              <a:extLst>
+                <a:ext uri="{FF2B5EF4-FFF2-40B4-BE49-F238E27FC236}">
+                  <a16:creationId xmlns:a16="http://schemas.microsoft.com/office/drawing/2014/main" id="{43A7DCC7-E9C8-4B4B-BBF2-77860A32A7A2}"/>
+                </a:ext>
+              </a:extLst>
+            </p:cNvPr>
+            <p:cNvSpPr txBox="1"/>
+            <p:nvPr/>
+          </p:nvSpPr>
+          <p:spPr>
+            <a:xfrm>
+              <a:off x="5314639" y="3508214"/>
+              <a:ext cx="1244060" cy="646331"/>
+            </a:xfrm>
+            <a:prstGeom prst="rect">
+              <a:avLst/>
+            </a:prstGeom>
+            <a:noFill/>
+          </p:spPr>
+          <p:txBody>
+            <a:bodyPr wrap="none" rtlCol="0">
+              <a:spAutoFit/>
+            </a:bodyPr>
+            <a:lstStyle/>
+            <a:p>
+              <a:pPr algn="ctr"/>
+              <a:r>
+                <a:rPr lang="en-GB" dirty="0">
+                  <a:latin typeface="Segoe UI Semibold" panose="020B0702040204020203" pitchFamily="34" charset="0"/>
+                  <a:cs typeface="Segoe UI Semibold" panose="020B0702040204020203" pitchFamily="34" charset="0"/>
+                </a:rPr>
+                <a:t>Azure Site</a:t>
+              </a:r>
+            </a:p>
+            <a:p>
+              <a:pPr algn="ctr"/>
+              <a:r>
+                <a:rPr lang="en-GB" dirty="0">
+                  <a:latin typeface="Segoe UI Semibold" panose="020B0702040204020203" pitchFamily="34" charset="0"/>
+                  <a:cs typeface="Segoe UI Semibold" panose="020B0702040204020203" pitchFamily="34" charset="0"/>
+                </a:rPr>
+                <a:t>Recovery</a:t>
+              </a:r>
+            </a:p>
+          </p:txBody>
+        </p:sp>
+        <p:sp>
+          <p:nvSpPr>
+            <p:cNvPr id="23" name="TextBox 22">
+              <a:extLst>
+                <a:ext uri="{FF2B5EF4-FFF2-40B4-BE49-F238E27FC236}">
+                  <a16:creationId xmlns:a16="http://schemas.microsoft.com/office/drawing/2014/main" id="{3F8D01DB-110C-4EE7-B886-44FC813AE76D}"/>
+                </a:ext>
+              </a:extLst>
+            </p:cNvPr>
+            <p:cNvSpPr txBox="1"/>
+            <p:nvPr/>
+          </p:nvSpPr>
+          <p:spPr>
+            <a:xfrm>
+              <a:off x="8440660" y="4225619"/>
+              <a:ext cx="1563441" cy="369332"/>
+            </a:xfrm>
+            <a:prstGeom prst="rect">
+              <a:avLst/>
+            </a:prstGeom>
+            <a:noFill/>
+          </p:spPr>
+          <p:txBody>
+            <a:bodyPr wrap="none" rtlCol="0">
+              <a:spAutoFit/>
+            </a:bodyPr>
+            <a:lstStyle/>
+            <a:p>
+              <a:pPr algn="ctr"/>
+              <a:r>
+                <a:rPr lang="en-GB" dirty="0">
+                  <a:solidFill>
+                    <a:schemeClr val="bg1"/>
+                  </a:solidFill>
+                  <a:latin typeface="Segoe UI Semibold" panose="020B0702040204020203" pitchFamily="34" charset="0"/>
+                  <a:cs typeface="Segoe UI Semibold" panose="020B0702040204020203" pitchFamily="34" charset="0"/>
+                </a:rPr>
+                <a:t>Config (OVA)</a:t>
+              </a:r>
+            </a:p>
+          </p:txBody>
+        </p:sp>
+        <p:sp>
+          <p:nvSpPr>
+            <p:cNvPr id="24" name="TextBox 23">
+              <a:extLst>
+                <a:ext uri="{FF2B5EF4-FFF2-40B4-BE49-F238E27FC236}">
+                  <a16:creationId xmlns:a16="http://schemas.microsoft.com/office/drawing/2014/main" id="{2909B9BF-1F92-43C0-A98E-C16FAC56D2D0}"/>
+                </a:ext>
+              </a:extLst>
+            </p:cNvPr>
+            <p:cNvSpPr txBox="1"/>
+            <p:nvPr/>
+          </p:nvSpPr>
+          <p:spPr>
+            <a:xfrm>
+              <a:off x="1751031" y="1917902"/>
+              <a:ext cx="481222" cy="276999"/>
+            </a:xfrm>
+            <a:prstGeom prst="rect">
+              <a:avLst/>
+            </a:prstGeom>
+            <a:noFill/>
+          </p:spPr>
+          <p:txBody>
+            <a:bodyPr wrap="none" rtlCol="0">
+              <a:spAutoFit/>
+            </a:bodyPr>
+            <a:lstStyle/>
+            <a:p>
+              <a:pPr algn="ctr"/>
+              <a:r>
+                <a:rPr lang="en-GB" sz="1200" dirty="0">
+                  <a:solidFill>
+                    <a:schemeClr val="bg1"/>
+                  </a:solidFill>
+                  <a:latin typeface="Segoe UI Semibold" panose="020B0702040204020203" pitchFamily="34" charset="0"/>
+                  <a:cs typeface="Segoe UI Semibold" panose="020B0702040204020203" pitchFamily="34" charset="0"/>
+                </a:rPr>
+                <a:t>RDP</a:t>
+              </a:r>
+            </a:p>
+          </p:txBody>
+        </p:sp>
+        <p:sp>
+          <p:nvSpPr>
+            <p:cNvPr id="25" name="TextBox 24">
+              <a:extLst>
+                <a:ext uri="{FF2B5EF4-FFF2-40B4-BE49-F238E27FC236}">
+                  <a16:creationId xmlns:a16="http://schemas.microsoft.com/office/drawing/2014/main" id="{E28BD2AA-DD4C-4BD6-8B8B-9255F7857517}"/>
+                </a:ext>
+              </a:extLst>
+            </p:cNvPr>
+            <p:cNvSpPr txBox="1"/>
+            <p:nvPr/>
+          </p:nvSpPr>
+          <p:spPr>
+            <a:xfrm>
+              <a:off x="3080855" y="1917902"/>
+              <a:ext cx="481222" cy="276999"/>
+            </a:xfrm>
+            <a:prstGeom prst="rect">
+              <a:avLst/>
+            </a:prstGeom>
+            <a:noFill/>
+          </p:spPr>
+          <p:txBody>
+            <a:bodyPr wrap="none" rtlCol="0">
+              <a:spAutoFit/>
+            </a:bodyPr>
+            <a:lstStyle/>
+            <a:p>
+              <a:pPr algn="ctr"/>
+              <a:r>
+                <a:rPr lang="en-GB" sz="1200" dirty="0">
+                  <a:solidFill>
+                    <a:schemeClr val="bg1"/>
+                  </a:solidFill>
+                  <a:latin typeface="Segoe UI Semibold" panose="020B0702040204020203" pitchFamily="34" charset="0"/>
+                  <a:cs typeface="Segoe UI Semibold" panose="020B0702040204020203" pitchFamily="34" charset="0"/>
+                </a:rPr>
+                <a:t>RDP</a:t>
+              </a:r>
+            </a:p>
+          </p:txBody>
+        </p:sp>
+        <p:sp>
+          <p:nvSpPr>
+            <p:cNvPr id="26" name="TextBox 25">
+              <a:extLst>
+                <a:ext uri="{FF2B5EF4-FFF2-40B4-BE49-F238E27FC236}">
+                  <a16:creationId xmlns:a16="http://schemas.microsoft.com/office/drawing/2014/main" id="{053096C9-F1A6-4F9D-B13C-A217D49FA96B}"/>
+                </a:ext>
+              </a:extLst>
+            </p:cNvPr>
+            <p:cNvSpPr txBox="1"/>
+            <p:nvPr/>
+          </p:nvSpPr>
+          <p:spPr>
+            <a:xfrm>
+              <a:off x="3080855" y="2750197"/>
+              <a:ext cx="481222" cy="276999"/>
+            </a:xfrm>
+            <a:prstGeom prst="rect">
+              <a:avLst/>
+            </a:prstGeom>
+            <a:noFill/>
+          </p:spPr>
+          <p:txBody>
+            <a:bodyPr wrap="none" rtlCol="0">
+              <a:spAutoFit/>
+            </a:bodyPr>
+            <a:lstStyle/>
+            <a:p>
+              <a:pPr algn="ctr"/>
+              <a:r>
+                <a:rPr lang="en-GB" sz="1200" dirty="0">
+                  <a:solidFill>
+                    <a:schemeClr val="bg1"/>
+                  </a:solidFill>
+                  <a:latin typeface="Segoe UI Semibold" panose="020B0702040204020203" pitchFamily="34" charset="0"/>
+                  <a:cs typeface="Segoe UI Semibold" panose="020B0702040204020203" pitchFamily="34" charset="0"/>
+                </a:rPr>
+                <a:t>RDP</a:t>
+              </a:r>
+            </a:p>
+          </p:txBody>
+        </p:sp>
+        <p:sp>
+          <p:nvSpPr>
+            <p:cNvPr id="27" name="TextBox 26">
+              <a:extLst>
+                <a:ext uri="{FF2B5EF4-FFF2-40B4-BE49-F238E27FC236}">
+                  <a16:creationId xmlns:a16="http://schemas.microsoft.com/office/drawing/2014/main" id="{BCA99A7C-CBF5-4EAB-885B-AB219EA90D66}"/>
+                </a:ext>
+              </a:extLst>
+            </p:cNvPr>
+            <p:cNvSpPr txBox="1"/>
+            <p:nvPr/>
+          </p:nvSpPr>
+          <p:spPr>
+            <a:xfrm>
+              <a:off x="1751031" y="2752934"/>
+              <a:ext cx="481222" cy="276999"/>
+            </a:xfrm>
+            <a:prstGeom prst="rect">
+              <a:avLst/>
+            </a:prstGeom>
+            <a:noFill/>
+          </p:spPr>
+          <p:txBody>
+            <a:bodyPr wrap="none" rtlCol="0">
+              <a:spAutoFit/>
+            </a:bodyPr>
+            <a:lstStyle/>
+            <a:p>
+              <a:pPr algn="ctr"/>
+              <a:r>
+                <a:rPr lang="en-GB" sz="1200" dirty="0">
+                  <a:solidFill>
+                    <a:schemeClr val="bg1"/>
+                  </a:solidFill>
+                  <a:latin typeface="Segoe UI Semibold" panose="020B0702040204020203" pitchFamily="34" charset="0"/>
+                  <a:cs typeface="Segoe UI Semibold" panose="020B0702040204020203" pitchFamily="34" charset="0"/>
+                </a:rPr>
+                <a:t>RDP</a:t>
+              </a:r>
+            </a:p>
+          </p:txBody>
+        </p:sp>
+        <p:sp>
+          <p:nvSpPr>
+            <p:cNvPr id="28" name="TextBox 27">
+              <a:extLst>
+                <a:ext uri="{FF2B5EF4-FFF2-40B4-BE49-F238E27FC236}">
+                  <a16:creationId xmlns:a16="http://schemas.microsoft.com/office/drawing/2014/main" id="{215A2A7F-57BD-4F68-BECF-A48364F83E33}"/>
+                </a:ext>
+              </a:extLst>
+            </p:cNvPr>
+            <p:cNvSpPr txBox="1"/>
+            <p:nvPr/>
+          </p:nvSpPr>
+          <p:spPr>
+            <a:xfrm>
+              <a:off x="8300426" y="1861340"/>
+              <a:ext cx="766557" cy="461665"/>
+            </a:xfrm>
+            <a:prstGeom prst="rect">
+              <a:avLst/>
+            </a:prstGeom>
+            <a:noFill/>
+          </p:spPr>
+          <p:txBody>
+            <a:bodyPr wrap="none" rtlCol="0">
+              <a:spAutoFit/>
+            </a:bodyPr>
+            <a:lstStyle/>
+            <a:p>
+              <a:pPr algn="ctr"/>
+              <a:r>
+                <a:rPr lang="en-GB" sz="1200" dirty="0">
+                  <a:solidFill>
+                    <a:schemeClr val="bg1"/>
+                  </a:solidFill>
+                  <a:latin typeface="Segoe UI Semibold" panose="020B0702040204020203" pitchFamily="34" charset="0"/>
+                  <a:cs typeface="Segoe UI Semibold" panose="020B0702040204020203" pitchFamily="34" charset="0"/>
+                </a:rPr>
+                <a:t>RDP</a:t>
+              </a:r>
+            </a:p>
+            <a:p>
+              <a:pPr algn="ctr"/>
+              <a:r>
+                <a:rPr lang="en-GB" sz="1200" dirty="0">
+                  <a:solidFill>
+                    <a:schemeClr val="bg1"/>
+                  </a:solidFill>
+                  <a:latin typeface="Segoe UI Semibold" panose="020B0702040204020203" pitchFamily="34" charset="0"/>
+                  <a:cs typeface="Segoe UI Semibold" panose="020B0702040204020203" pitchFamily="34" charset="0"/>
+                </a:rPr>
+                <a:t>Mobility</a:t>
+              </a:r>
+            </a:p>
+          </p:txBody>
+        </p:sp>
+        <p:sp>
+          <p:nvSpPr>
+            <p:cNvPr id="32" name="TextBox 31">
+              <a:extLst>
+                <a:ext uri="{FF2B5EF4-FFF2-40B4-BE49-F238E27FC236}">
+                  <a16:creationId xmlns:a16="http://schemas.microsoft.com/office/drawing/2014/main" id="{C0F13FC5-9186-4208-BBAB-868531FF57E7}"/>
+                </a:ext>
+              </a:extLst>
+            </p:cNvPr>
+            <p:cNvSpPr txBox="1"/>
+            <p:nvPr/>
+          </p:nvSpPr>
+          <p:spPr>
+            <a:xfrm>
+              <a:off x="7878224" y="912714"/>
+              <a:ext cx="2931736" cy="369332"/>
+            </a:xfrm>
+            <a:prstGeom prst="rect">
+              <a:avLst/>
+            </a:prstGeom>
+            <a:noFill/>
+          </p:spPr>
+          <p:txBody>
+            <a:bodyPr wrap="square" rtlCol="0">
+              <a:spAutoFit/>
+            </a:bodyPr>
+            <a:lstStyle/>
+            <a:p>
+              <a:pPr algn="ctr"/>
+              <a:r>
+                <a:rPr lang="en-GB" dirty="0">
+                  <a:latin typeface="Segoe UI Semibold" panose="020B0702040204020203" pitchFamily="34" charset="0"/>
+                  <a:cs typeface="Segoe UI Semibold" panose="020B0702040204020203" pitchFamily="34" charset="0"/>
+                </a:rPr>
+                <a:t>Source</a:t>
+              </a:r>
+            </a:p>
+          </p:txBody>
+        </p:sp>
+        <p:sp>
+          <p:nvSpPr>
+            <p:cNvPr id="33" name="TextBox 32">
+              <a:extLst>
+                <a:ext uri="{FF2B5EF4-FFF2-40B4-BE49-F238E27FC236}">
+                  <a16:creationId xmlns:a16="http://schemas.microsoft.com/office/drawing/2014/main" id="{52327F97-DB38-4754-9AE2-7ACFC40ACF54}"/>
+                </a:ext>
+              </a:extLst>
+            </p:cNvPr>
+            <p:cNvSpPr txBox="1"/>
+            <p:nvPr/>
+          </p:nvSpPr>
+          <p:spPr>
+            <a:xfrm>
+              <a:off x="1183520" y="912714"/>
+              <a:ext cx="2931736" cy="369332"/>
+            </a:xfrm>
+            <a:prstGeom prst="rect">
+              <a:avLst/>
+            </a:prstGeom>
+            <a:noFill/>
+          </p:spPr>
+          <p:txBody>
+            <a:bodyPr wrap="square" rtlCol="0">
+              <a:spAutoFit/>
+            </a:bodyPr>
+            <a:lstStyle/>
+            <a:p>
+              <a:pPr algn="ctr"/>
+              <a:r>
+                <a:rPr lang="en-GB" dirty="0">
+                  <a:latin typeface="Segoe UI Semibold" panose="020B0702040204020203" pitchFamily="34" charset="0"/>
+                  <a:cs typeface="Segoe UI Semibold" panose="020B0702040204020203" pitchFamily="34" charset="0"/>
+                </a:rPr>
+                <a:t>Target</a:t>
+              </a:r>
+            </a:p>
+          </p:txBody>
+        </p:sp>
+        <p:sp>
+          <p:nvSpPr>
+            <p:cNvPr id="34" name="TextBox 33">
+              <a:extLst>
+                <a:ext uri="{FF2B5EF4-FFF2-40B4-BE49-F238E27FC236}">
+                  <a16:creationId xmlns:a16="http://schemas.microsoft.com/office/drawing/2014/main" id="{86F0989D-846D-4EED-9902-806598B108F7}"/>
+                </a:ext>
+              </a:extLst>
+            </p:cNvPr>
+            <p:cNvSpPr txBox="1"/>
+            <p:nvPr/>
+          </p:nvSpPr>
+          <p:spPr>
+            <a:xfrm>
+              <a:off x="9632891" y="1861340"/>
+              <a:ext cx="766557" cy="461665"/>
+            </a:xfrm>
+            <a:prstGeom prst="rect">
+              <a:avLst/>
+            </a:prstGeom>
+            <a:noFill/>
+          </p:spPr>
+          <p:txBody>
+            <a:bodyPr wrap="none" rtlCol="0">
+              <a:spAutoFit/>
+            </a:bodyPr>
+            <a:lstStyle/>
+            <a:p>
+              <a:pPr algn="ctr"/>
+              <a:r>
+                <a:rPr lang="en-GB" sz="1200" dirty="0">
+                  <a:solidFill>
+                    <a:schemeClr val="bg1"/>
+                  </a:solidFill>
+                  <a:latin typeface="Segoe UI Semibold" panose="020B0702040204020203" pitchFamily="34" charset="0"/>
+                  <a:cs typeface="Segoe UI Semibold" panose="020B0702040204020203" pitchFamily="34" charset="0"/>
+                </a:rPr>
+                <a:t>RDP</a:t>
+              </a:r>
+            </a:p>
+            <a:p>
+              <a:pPr algn="ctr"/>
+              <a:r>
+                <a:rPr lang="en-GB" sz="1200" dirty="0">
+                  <a:solidFill>
+                    <a:schemeClr val="bg1"/>
+                  </a:solidFill>
+                  <a:latin typeface="Segoe UI Semibold" panose="020B0702040204020203" pitchFamily="34" charset="0"/>
+                  <a:cs typeface="Segoe UI Semibold" panose="020B0702040204020203" pitchFamily="34" charset="0"/>
+                </a:rPr>
+                <a:t>Mobility</a:t>
+              </a:r>
+            </a:p>
+          </p:txBody>
+        </p:sp>
+        <p:sp>
+          <p:nvSpPr>
+            <p:cNvPr id="35" name="TextBox 34">
+              <a:extLst>
+                <a:ext uri="{FF2B5EF4-FFF2-40B4-BE49-F238E27FC236}">
+                  <a16:creationId xmlns:a16="http://schemas.microsoft.com/office/drawing/2014/main" id="{0C238313-CBAE-4384-BD3C-B21E91B66AAF}"/>
+                </a:ext>
+              </a:extLst>
+            </p:cNvPr>
+            <p:cNvSpPr txBox="1"/>
+            <p:nvPr/>
+          </p:nvSpPr>
+          <p:spPr>
+            <a:xfrm>
+              <a:off x="9632891" y="2715044"/>
+              <a:ext cx="766557" cy="461665"/>
+            </a:xfrm>
+            <a:prstGeom prst="rect">
+              <a:avLst/>
+            </a:prstGeom>
+            <a:noFill/>
+          </p:spPr>
+          <p:txBody>
+            <a:bodyPr wrap="none" rtlCol="0">
+              <a:spAutoFit/>
+            </a:bodyPr>
+            <a:lstStyle/>
+            <a:p>
+              <a:pPr algn="ctr"/>
+              <a:r>
+                <a:rPr lang="en-GB" sz="1200" dirty="0">
+                  <a:solidFill>
+                    <a:schemeClr val="bg1"/>
+                  </a:solidFill>
+                  <a:latin typeface="Segoe UI Semibold" panose="020B0702040204020203" pitchFamily="34" charset="0"/>
+                  <a:cs typeface="Segoe UI Semibold" panose="020B0702040204020203" pitchFamily="34" charset="0"/>
+                </a:rPr>
+                <a:t>RDP</a:t>
+              </a:r>
+            </a:p>
+            <a:p>
+              <a:pPr algn="ctr"/>
+              <a:r>
+                <a:rPr lang="en-GB" sz="1200" dirty="0">
+                  <a:solidFill>
+                    <a:schemeClr val="bg1"/>
+                  </a:solidFill>
+                  <a:latin typeface="Segoe UI Semibold" panose="020B0702040204020203" pitchFamily="34" charset="0"/>
+                  <a:cs typeface="Segoe UI Semibold" panose="020B0702040204020203" pitchFamily="34" charset="0"/>
+                </a:rPr>
+                <a:t>Mobility</a:t>
+              </a:r>
+            </a:p>
+          </p:txBody>
+        </p:sp>
+        <p:sp>
+          <p:nvSpPr>
+            <p:cNvPr id="36" name="TextBox 35">
+              <a:extLst>
+                <a:ext uri="{FF2B5EF4-FFF2-40B4-BE49-F238E27FC236}">
+                  <a16:creationId xmlns:a16="http://schemas.microsoft.com/office/drawing/2014/main" id="{1AF269EB-A66A-424F-B300-10A1933EC14E}"/>
+                </a:ext>
+              </a:extLst>
+            </p:cNvPr>
+            <p:cNvSpPr txBox="1"/>
+            <p:nvPr/>
+          </p:nvSpPr>
+          <p:spPr>
+            <a:xfrm>
+              <a:off x="8300426" y="2715044"/>
+              <a:ext cx="766557" cy="461665"/>
+            </a:xfrm>
+            <a:prstGeom prst="rect">
+              <a:avLst/>
+            </a:prstGeom>
+            <a:noFill/>
+          </p:spPr>
+          <p:txBody>
+            <a:bodyPr wrap="none" rtlCol="0">
+              <a:spAutoFit/>
+            </a:bodyPr>
+            <a:lstStyle/>
+            <a:p>
+              <a:pPr algn="ctr"/>
+              <a:r>
+                <a:rPr lang="en-GB" sz="1200" dirty="0">
+                  <a:solidFill>
+                    <a:schemeClr val="bg1"/>
+                  </a:solidFill>
+                  <a:latin typeface="Segoe UI Semibold" panose="020B0702040204020203" pitchFamily="34" charset="0"/>
+                  <a:cs typeface="Segoe UI Semibold" panose="020B0702040204020203" pitchFamily="34" charset="0"/>
+                </a:rPr>
+                <a:t>RDP</a:t>
+              </a:r>
+            </a:p>
+            <a:p>
+              <a:pPr algn="ctr"/>
+              <a:r>
+                <a:rPr lang="en-GB" sz="1200" dirty="0">
+                  <a:solidFill>
+                    <a:schemeClr val="bg1"/>
+                  </a:solidFill>
+                  <a:latin typeface="Segoe UI Semibold" panose="020B0702040204020203" pitchFamily="34" charset="0"/>
+                  <a:cs typeface="Segoe UI Semibold" panose="020B0702040204020203" pitchFamily="34" charset="0"/>
+                </a:rPr>
+                <a:t>Mobility</a:t>
+              </a:r>
+            </a:p>
+          </p:txBody>
+        </p:sp>
+        <p:sp>
+          <p:nvSpPr>
+            <p:cNvPr id="37" name="TextBox 36">
+              <a:extLst>
+                <a:ext uri="{FF2B5EF4-FFF2-40B4-BE49-F238E27FC236}">
+                  <a16:creationId xmlns:a16="http://schemas.microsoft.com/office/drawing/2014/main" id="{FC0EA097-85E0-418A-9C16-6E09450B1100}"/>
+                </a:ext>
+              </a:extLst>
+            </p:cNvPr>
+            <p:cNvSpPr txBox="1"/>
+            <p:nvPr/>
+          </p:nvSpPr>
+          <p:spPr>
+            <a:xfrm>
+              <a:off x="4680721" y="2731962"/>
+              <a:ext cx="487634" cy="276999"/>
+            </a:xfrm>
+            <a:prstGeom prst="rect">
+              <a:avLst/>
+            </a:prstGeom>
+            <a:noFill/>
+          </p:spPr>
+          <p:txBody>
+            <a:bodyPr wrap="none" rtlCol="0">
+              <a:spAutoFit/>
+            </a:bodyPr>
+            <a:lstStyle/>
+            <a:p>
+              <a:pPr algn="ctr"/>
+              <a:r>
+                <a:rPr lang="en-GB" sz="1200" dirty="0">
+                  <a:solidFill>
+                    <a:schemeClr val="bg1"/>
+                  </a:solidFill>
+                  <a:latin typeface="Segoe UI Semibold" panose="020B0702040204020203" pitchFamily="34" charset="0"/>
+                  <a:cs typeface="Segoe UI Semibold" panose="020B0702040204020203" pitchFamily="34" charset="0"/>
+                </a:rPr>
+                <a:t>RPO</a:t>
+              </a:r>
+            </a:p>
+          </p:txBody>
+        </p:sp>
+        <p:sp>
+          <p:nvSpPr>
+            <p:cNvPr id="38" name="TextBox 37">
+              <a:extLst>
+                <a:ext uri="{FF2B5EF4-FFF2-40B4-BE49-F238E27FC236}">
+                  <a16:creationId xmlns:a16="http://schemas.microsoft.com/office/drawing/2014/main" id="{CC8391E7-39C2-4C56-B996-8BEB4681B59E}"/>
+                </a:ext>
+              </a:extLst>
+            </p:cNvPr>
+            <p:cNvSpPr txBox="1"/>
+            <p:nvPr/>
+          </p:nvSpPr>
+          <p:spPr>
+            <a:xfrm>
+              <a:off x="7376652" y="2731962"/>
+              <a:ext cx="487634" cy="276999"/>
+            </a:xfrm>
+            <a:prstGeom prst="rect">
+              <a:avLst/>
+            </a:prstGeom>
+            <a:noFill/>
+          </p:spPr>
+          <p:txBody>
+            <a:bodyPr wrap="none" rtlCol="0">
+              <a:spAutoFit/>
+            </a:bodyPr>
+            <a:lstStyle/>
+            <a:p>
+              <a:pPr algn="ctr"/>
+              <a:r>
+                <a:rPr lang="en-GB" sz="1200" dirty="0">
+                  <a:solidFill>
+                    <a:schemeClr val="bg1"/>
+                  </a:solidFill>
+                  <a:latin typeface="Segoe UI Semibold" panose="020B0702040204020203" pitchFamily="34" charset="0"/>
+                  <a:cs typeface="Segoe UI Semibold" panose="020B0702040204020203" pitchFamily="34" charset="0"/>
+                </a:rPr>
+                <a:t>RPO</a:t>
+              </a:r>
+            </a:p>
+          </p:txBody>
+        </p:sp>
+        <p:sp>
+          <p:nvSpPr>
+            <p:cNvPr id="39" name="TextBox 38">
+              <a:extLst>
+                <a:ext uri="{FF2B5EF4-FFF2-40B4-BE49-F238E27FC236}">
+                  <a16:creationId xmlns:a16="http://schemas.microsoft.com/office/drawing/2014/main" id="{AD323248-6C17-4040-9084-3C24113D29A9}"/>
+                </a:ext>
+              </a:extLst>
+            </p:cNvPr>
+            <p:cNvSpPr txBox="1"/>
+            <p:nvPr/>
+          </p:nvSpPr>
+          <p:spPr>
+            <a:xfrm>
+              <a:off x="7878224" y="4613365"/>
+              <a:ext cx="2931736" cy="369332"/>
+            </a:xfrm>
+            <a:prstGeom prst="rect">
+              <a:avLst/>
+            </a:prstGeom>
+            <a:noFill/>
+          </p:spPr>
+          <p:txBody>
+            <a:bodyPr wrap="square" rtlCol="0">
+              <a:spAutoFit/>
+            </a:bodyPr>
+            <a:lstStyle/>
+            <a:p>
+              <a:pPr algn="ctr"/>
+              <a:r>
+                <a:rPr lang="en-GB" dirty="0">
+                  <a:latin typeface="Segoe UI Semibold" panose="020B0702040204020203" pitchFamily="34" charset="0"/>
+                  <a:cs typeface="Segoe UI Semibold" panose="020B0702040204020203" pitchFamily="34" charset="0"/>
+                </a:rPr>
+                <a:t>VMWare on-premises</a:t>
+              </a:r>
+            </a:p>
+          </p:txBody>
+        </p:sp>
+        <p:sp>
+          <p:nvSpPr>
+            <p:cNvPr id="40" name="TextBox 39">
+              <a:extLst>
+                <a:ext uri="{FF2B5EF4-FFF2-40B4-BE49-F238E27FC236}">
+                  <a16:creationId xmlns:a16="http://schemas.microsoft.com/office/drawing/2014/main" id="{10D2BBAC-85F4-4BAB-AE75-DF473C61D3CC}"/>
+                </a:ext>
+              </a:extLst>
+            </p:cNvPr>
+            <p:cNvSpPr txBox="1"/>
+            <p:nvPr/>
+          </p:nvSpPr>
+          <p:spPr>
+            <a:xfrm>
+              <a:off x="1183520" y="4613365"/>
+              <a:ext cx="2931736" cy="369332"/>
+            </a:xfrm>
+            <a:prstGeom prst="rect">
+              <a:avLst/>
+            </a:prstGeom>
+            <a:noFill/>
+          </p:spPr>
+          <p:txBody>
+            <a:bodyPr wrap="square" rtlCol="0">
+              <a:spAutoFit/>
+            </a:bodyPr>
+            <a:lstStyle/>
+            <a:p>
+              <a:pPr algn="ctr"/>
+              <a:r>
+                <a:rPr lang="en-GB" dirty="0">
+                  <a:latin typeface="Segoe UI Semibold" panose="020B0702040204020203" pitchFamily="34" charset="0"/>
+                  <a:cs typeface="Segoe UI Semibold" panose="020B0702040204020203" pitchFamily="34" charset="0"/>
+                </a:rPr>
+                <a:t>Azure</a:t>
+              </a:r>
+            </a:p>
+          </p:txBody>
+        </p:sp>
+      </p:grpSp>
+    </p:spTree>
+    <p:extLst>
+      <p:ext uri="{BB962C8B-B14F-4D97-AF65-F5344CB8AC3E}">
+        <p14:creationId xmlns:p14="http://schemas.microsoft.com/office/powerpoint/2010/main" val="1667804432"/>
+      </p:ext>
+    </p:extLst>
+  </p:cSld>
+  <p:clrMapOvr>
+    <a:masterClrMapping/>
+  </p:clrMapOvr>
+</p:sld>
+</file>
+
 <file path=ppt/theme/theme1.xml><?xml version="1.0" encoding="utf-8"?>
 <a:theme xmlns:a="http://schemas.openxmlformats.org/drawingml/2006/main" name="Office Theme">
   <a:themeElements>

</xml_diff>